<commit_message>
Reorganised code and updated variance comparison
</commit_message>
<xml_diff>
--- a/resources/figures/figures.pptx
+++ b/resources/figures/figures.pptx
@@ -8,6 +8,7 @@
     <p:sldId id="256" r:id="rId2"/>
     <p:sldId id="257" r:id="rId3"/>
     <p:sldId id="258" r:id="rId4"/>
+    <p:sldId id="259" r:id="rId5"/>
   </p:sldIdLst>
   <p:sldSz cx="12192000" cy="6858000"/>
   <p:notesSz cx="6858000" cy="9144000"/>
@@ -106,6 +107,11 @@
       </a:defRPr>
     </a:lvl9pPr>
   </p:defaultTextStyle>
+  <p:extLst>
+    <p:ext uri="{EFAFB233-063F-42B5-8137-9DF3F51BA10A}">
+      <p15:sldGuideLst xmlns:p15="http://schemas.microsoft.com/office/powerpoint/2012/main"/>
+    </p:ext>
+  </p:extLst>
 </p:presentation>
 </file>
 
@@ -240,7 +246,7 @@
           <a:p>
             <a:fld id="{456E3D89-B378-4924-B26C-18907C87AD14}" type="datetimeFigureOut">
               <a:rPr lang="en-GB" smtClean="0"/>
-              <a:t>16/12/2020</a:t>
+              <a:t>17/12/2020</a:t>
             </a:fld>
             <a:endParaRPr lang="en-GB"/>
           </a:p>
@@ -410,7 +416,7 @@
           <a:p>
             <a:fld id="{456E3D89-B378-4924-B26C-18907C87AD14}" type="datetimeFigureOut">
               <a:rPr lang="en-GB" smtClean="0"/>
-              <a:t>16/12/2020</a:t>
+              <a:t>17/12/2020</a:t>
             </a:fld>
             <a:endParaRPr lang="en-GB"/>
           </a:p>
@@ -590,7 +596,7 @@
           <a:p>
             <a:fld id="{456E3D89-B378-4924-B26C-18907C87AD14}" type="datetimeFigureOut">
               <a:rPr lang="en-GB" smtClean="0"/>
-              <a:t>16/12/2020</a:t>
+              <a:t>17/12/2020</a:t>
             </a:fld>
             <a:endParaRPr lang="en-GB"/>
           </a:p>
@@ -760,7 +766,7 @@
           <a:p>
             <a:fld id="{456E3D89-B378-4924-B26C-18907C87AD14}" type="datetimeFigureOut">
               <a:rPr lang="en-GB" smtClean="0"/>
-              <a:t>16/12/2020</a:t>
+              <a:t>17/12/2020</a:t>
             </a:fld>
             <a:endParaRPr lang="en-GB"/>
           </a:p>
@@ -1006,7 +1012,7 @@
           <a:p>
             <a:fld id="{456E3D89-B378-4924-B26C-18907C87AD14}" type="datetimeFigureOut">
               <a:rPr lang="en-GB" smtClean="0"/>
-              <a:t>16/12/2020</a:t>
+              <a:t>17/12/2020</a:t>
             </a:fld>
             <a:endParaRPr lang="en-GB"/>
           </a:p>
@@ -1238,7 +1244,7 @@
           <a:p>
             <a:fld id="{456E3D89-B378-4924-B26C-18907C87AD14}" type="datetimeFigureOut">
               <a:rPr lang="en-GB" smtClean="0"/>
-              <a:t>16/12/2020</a:t>
+              <a:t>17/12/2020</a:t>
             </a:fld>
             <a:endParaRPr lang="en-GB"/>
           </a:p>
@@ -1605,7 +1611,7 @@
           <a:p>
             <a:fld id="{456E3D89-B378-4924-B26C-18907C87AD14}" type="datetimeFigureOut">
               <a:rPr lang="en-GB" smtClean="0"/>
-              <a:t>16/12/2020</a:t>
+              <a:t>17/12/2020</a:t>
             </a:fld>
             <a:endParaRPr lang="en-GB"/>
           </a:p>
@@ -1723,7 +1729,7 @@
           <a:p>
             <a:fld id="{456E3D89-B378-4924-B26C-18907C87AD14}" type="datetimeFigureOut">
               <a:rPr lang="en-GB" smtClean="0"/>
-              <a:t>16/12/2020</a:t>
+              <a:t>17/12/2020</a:t>
             </a:fld>
             <a:endParaRPr lang="en-GB"/>
           </a:p>
@@ -1818,7 +1824,7 @@
           <a:p>
             <a:fld id="{456E3D89-B378-4924-B26C-18907C87AD14}" type="datetimeFigureOut">
               <a:rPr lang="en-GB" smtClean="0"/>
-              <a:t>16/12/2020</a:t>
+              <a:t>17/12/2020</a:t>
             </a:fld>
             <a:endParaRPr lang="en-GB"/>
           </a:p>
@@ -2095,7 +2101,7 @@
           <a:p>
             <a:fld id="{456E3D89-B378-4924-B26C-18907C87AD14}" type="datetimeFigureOut">
               <a:rPr lang="en-GB" smtClean="0"/>
-              <a:t>16/12/2020</a:t>
+              <a:t>17/12/2020</a:t>
             </a:fld>
             <a:endParaRPr lang="en-GB"/>
           </a:p>
@@ -2348,7 +2354,7 @@
           <a:p>
             <a:fld id="{456E3D89-B378-4924-B26C-18907C87AD14}" type="datetimeFigureOut">
               <a:rPr lang="en-GB" smtClean="0"/>
-              <a:t>16/12/2020</a:t>
+              <a:t>17/12/2020</a:t>
             </a:fld>
             <a:endParaRPr lang="en-GB"/>
           </a:p>
@@ -2561,7 +2567,7 @@
           <a:p>
             <a:fld id="{456E3D89-B378-4924-B26C-18907C87AD14}" type="datetimeFigureOut">
               <a:rPr lang="en-GB" smtClean="0"/>
-              <a:t>16/12/2020</a:t>
+              <a:t>17/12/2020</a:t>
             </a:fld>
             <a:endParaRPr lang="en-GB"/>
           </a:p>
@@ -3071,21 +3077,21 @@
       </p:grpSpPr>
       <p:grpSp>
         <p:nvGrpSpPr>
-          <p:cNvPr id="6" name="Group 5"/>
+          <p:cNvPr id="11" name="Group 10"/>
           <p:cNvGrpSpPr/>
           <p:nvPr/>
         </p:nvGrpSpPr>
         <p:grpSpPr>
           <a:xfrm>
-            <a:off x="3441693" y="126999"/>
-            <a:ext cx="5040000" cy="6197604"/>
-            <a:chOff x="3441693" y="126999"/>
-            <a:chExt cx="5040000" cy="6197604"/>
+            <a:off x="-723907" y="-198000"/>
+            <a:ext cx="11524400" cy="7542000"/>
+            <a:chOff x="-723907" y="-198000"/>
+            <a:chExt cx="11524400" cy="7542000"/>
           </a:xfrm>
         </p:grpSpPr>
         <p:pic>
           <p:nvPicPr>
-            <p:cNvPr id="4" name="Picture 3"/>
+            <p:cNvPr id="9" name="Picture 8"/>
             <p:cNvPicPr>
               <a:picLocks noChangeAspect="1"/>
             </p:cNvPicPr>
@@ -3099,13 +3105,13 @@
                 </a:ext>
               </a:extLst>
             </a:blip>
-            <a:srcRect r="8137"/>
+            <a:srcRect t="10399" r="7199" b="2986"/>
             <a:stretch/>
           </p:blipFill>
           <p:spPr>
             <a:xfrm>
-              <a:off x="3441693" y="2666996"/>
-              <a:ext cx="5040000" cy="3657607"/>
+              <a:off x="4860493" y="3384000"/>
+              <a:ext cx="5940000" cy="3960000"/>
             </a:xfrm>
             <a:prstGeom prst="rect">
               <a:avLst/>
@@ -3114,7 +3120,7 @@
         </p:pic>
         <p:pic>
           <p:nvPicPr>
-            <p:cNvPr id="5" name="Picture 4"/>
+            <p:cNvPr id="10" name="Picture 9"/>
             <p:cNvPicPr>
               <a:picLocks noChangeAspect="1"/>
             </p:cNvPicPr>
@@ -3128,13 +3134,71 @@
                 </a:ext>
               </a:extLst>
             </a:blip>
-            <a:srcRect t="9722" r="8138" b="10417"/>
+            <a:srcRect t="10730" r="7199" b="10924"/>
             <a:stretch/>
           </p:blipFill>
           <p:spPr>
             <a:xfrm>
-              <a:off x="3441693" y="126999"/>
-              <a:ext cx="5040000" cy="2921001"/>
+              <a:off x="4860493" y="-198000"/>
+              <a:ext cx="5940000" cy="3582000"/>
+            </a:xfrm>
+            <a:prstGeom prst="rect">
+              <a:avLst/>
+            </a:prstGeom>
+          </p:spPr>
+        </p:pic>
+        <p:pic>
+          <p:nvPicPr>
+            <p:cNvPr id="2" name="Picture 1"/>
+            <p:cNvPicPr>
+              <a:picLocks noChangeAspect="1"/>
+            </p:cNvPicPr>
+            <p:nvPr/>
+          </p:nvPicPr>
+          <p:blipFill rotWithShape="1">
+            <a:blip r:embed="rId4" cstate="print">
+              <a:extLst>
+                <a:ext uri="{28A0092B-C50C-407E-A947-70E740481C1C}">
+                  <a14:useLocalDpi xmlns:a14="http://schemas.microsoft.com/office/drawing/2010/main" val="0"/>
+                </a:ext>
+              </a:extLst>
+            </a:blip>
+            <a:srcRect t="10730" r="7199" b="10924"/>
+            <a:stretch/>
+          </p:blipFill>
+          <p:spPr>
+            <a:xfrm>
+              <a:off x="-723907" y="-198000"/>
+              <a:ext cx="5940000" cy="3582000"/>
+            </a:xfrm>
+            <a:prstGeom prst="rect">
+              <a:avLst/>
+            </a:prstGeom>
+          </p:spPr>
+        </p:pic>
+        <p:pic>
+          <p:nvPicPr>
+            <p:cNvPr id="3" name="Picture 2"/>
+            <p:cNvPicPr>
+              <a:picLocks noChangeAspect="1"/>
+            </p:cNvPicPr>
+            <p:nvPr/>
+          </p:nvPicPr>
+          <p:blipFill rotWithShape="1">
+            <a:blip r:embed="rId5" cstate="print">
+              <a:extLst>
+                <a:ext uri="{28A0092B-C50C-407E-A947-70E740481C1C}">
+                  <a14:useLocalDpi xmlns:a14="http://schemas.microsoft.com/office/drawing/2010/main" val="0"/>
+                </a:ext>
+              </a:extLst>
+            </a:blip>
+            <a:srcRect t="10397" r="7199" b="2988"/>
+            <a:stretch/>
+          </p:blipFill>
+          <p:spPr>
+            <a:xfrm>
+              <a:off x="-723907" y="3384000"/>
+              <a:ext cx="5940000" cy="3960000"/>
             </a:xfrm>
             <a:prstGeom prst="rect">
               <a:avLst/>
@@ -3249,6 +3313,36 @@
     <p:extLst>
       <p:ext uri="{BB962C8B-B14F-4D97-AF65-F5344CB8AC3E}">
         <p14:creationId xmlns:p14="http://schemas.microsoft.com/office/powerpoint/2010/main" val="1387859964"/>
+      </p:ext>
+    </p:extLst>
+  </p:cSld>
+  <p:clrMapOvr>
+    <a:masterClrMapping/>
+  </p:clrMapOvr>
+</p:sld>
+</file>
+
+<file path=ppt/slides/slide4.xml><?xml version="1.0" encoding="utf-8"?>
+<p:sld xmlns:a="http://schemas.openxmlformats.org/drawingml/2006/main" xmlns:r="http://schemas.openxmlformats.org/officeDocument/2006/relationships" xmlns:p="http://schemas.openxmlformats.org/presentationml/2006/main">
+  <p:cSld>
+    <p:spTree>
+      <p:nvGrpSpPr>
+        <p:cNvPr id="1" name=""/>
+        <p:cNvGrpSpPr/>
+        <p:nvPr/>
+      </p:nvGrpSpPr>
+      <p:grpSpPr>
+        <a:xfrm>
+          <a:off x="0" y="0"/>
+          <a:ext cx="0" cy="0"/>
+          <a:chOff x="0" y="0"/>
+          <a:chExt cx="0" cy="0"/>
+        </a:xfrm>
+      </p:grpSpPr>
+    </p:spTree>
+    <p:extLst>
+      <p:ext uri="{BB962C8B-B14F-4D97-AF65-F5344CB8AC3E}">
+        <p14:creationId xmlns:p14="http://schemas.microsoft.com/office/powerpoint/2010/main" val="3547864718"/>
       </p:ext>
     </p:extLst>
   </p:cSld>

</xml_diff>